<commit_message>
fix karma installation steps
</commit_message>
<xml_diff>
--- a/slides/ng-bootcamp-day-1.pptx
+++ b/slides/ng-bootcamp-day-1.pptx
@@ -5743,6 +5743,13 @@
   <p:clrMapOvr>
     <a:masterClrMapping/>
   </p:clrMapOvr>
+  <p:timing>
+    <p:tnLst>
+      <p:par>
+        <p:cTn xmlns:p14="http://schemas.microsoft.com/office/powerpoint/2010/main" id="1" dur="indefinite" restart="never" nodeType="tmRoot"/>
+      </p:par>
+    </p:tnLst>
+  </p:timing>
 </p:sld>
 </file>
 
@@ -5893,6 +5900,13 @@
   <p:clrMapOvr>
     <a:masterClrMapping/>
   </p:clrMapOvr>
+  <p:timing>
+    <p:tnLst>
+      <p:par>
+        <p:cTn xmlns:p14="http://schemas.microsoft.com/office/powerpoint/2010/main" id="1" dur="indefinite" restart="never" nodeType="tmRoot"/>
+      </p:par>
+    </p:tnLst>
+  </p:timing>
 </p:sld>
 </file>
 
@@ -5973,6 +5987,13 @@
   <p:clrMapOvr>
     <a:masterClrMapping/>
   </p:clrMapOvr>
+  <p:timing>
+    <p:tnLst>
+      <p:par>
+        <p:cTn xmlns:p14="http://schemas.microsoft.com/office/powerpoint/2010/main" id="1" dur="indefinite" restart="never" nodeType="tmRoot"/>
+      </p:par>
+    </p:tnLst>
+  </p:timing>
 </p:sld>
 </file>
 
@@ -6067,6 +6088,13 @@
   <p:clrMapOvr>
     <a:masterClrMapping/>
   </p:clrMapOvr>
+  <p:timing>
+    <p:tnLst>
+      <p:par>
+        <p:cTn xmlns:p14="http://schemas.microsoft.com/office/powerpoint/2010/main" id="1" dur="indefinite" restart="never" nodeType="tmRoot"/>
+      </p:par>
+    </p:tnLst>
+  </p:timing>
 </p:sld>
 </file>
 
@@ -6243,6 +6271,13 @@
   <p:clrMapOvr>
     <a:masterClrMapping/>
   </p:clrMapOvr>
+  <p:timing>
+    <p:tnLst>
+      <p:par>
+        <p:cTn xmlns:p14="http://schemas.microsoft.com/office/powerpoint/2010/main" id="1" dur="indefinite" restart="never" nodeType="tmRoot"/>
+      </p:par>
+    </p:tnLst>
+  </p:timing>
 </p:sld>
 </file>
 
@@ -6350,6 +6385,13 @@
   <p:clrMapOvr>
     <a:masterClrMapping/>
   </p:clrMapOvr>
+  <p:timing>
+    <p:tnLst>
+      <p:par>
+        <p:cTn xmlns:p14="http://schemas.microsoft.com/office/powerpoint/2010/main" id="1" dur="indefinite" restart="never" nodeType="tmRoot"/>
+      </p:par>
+    </p:tnLst>
+  </p:timing>
 </p:sld>
 </file>
 
@@ -6493,6 +6535,13 @@
   <p:clrMapOvr>
     <a:masterClrMapping/>
   </p:clrMapOvr>
+  <p:timing>
+    <p:tnLst>
+      <p:par>
+        <p:cTn xmlns:p14="http://schemas.microsoft.com/office/powerpoint/2010/main" id="1" dur="indefinite" restart="never" nodeType="tmRoot"/>
+      </p:par>
+    </p:tnLst>
+  </p:timing>
 </p:sld>
 </file>
 
@@ -6696,6 +6745,13 @@
   <p:clrMapOvr>
     <a:masterClrMapping/>
   </p:clrMapOvr>
+  <p:timing>
+    <p:tnLst>
+      <p:par>
+        <p:cTn xmlns:p14="http://schemas.microsoft.com/office/powerpoint/2010/main" id="1" dur="indefinite" restart="never" nodeType="tmRoot"/>
+      </p:par>
+    </p:tnLst>
+  </p:timing>
 </p:sld>
 </file>
 
@@ -7618,6 +7674,13 @@
   <p:clrMapOvr>
     <a:masterClrMapping/>
   </p:clrMapOvr>
+  <p:timing>
+    <p:tnLst>
+      <p:par>
+        <p:cTn xmlns:p14="http://schemas.microsoft.com/office/powerpoint/2010/main" id="1" dur="indefinite" restart="never" nodeType="tmRoot"/>
+      </p:par>
+    </p:tnLst>
+  </p:timing>
 </p:sld>
 </file>
 
@@ -7724,6 +7787,13 @@
   <p:clrMapOvr>
     <a:masterClrMapping/>
   </p:clrMapOvr>
+  <p:timing>
+    <p:tnLst>
+      <p:par>
+        <p:cTn xmlns:p14="http://schemas.microsoft.com/office/powerpoint/2010/main" id="1" dur="indefinite" restart="never" nodeType="tmRoot"/>
+      </p:par>
+    </p:tnLst>
+  </p:timing>
 </p:sld>
 </file>
 
@@ -8604,6 +8674,13 @@
   <p:clrMapOvr>
     <a:masterClrMapping/>
   </p:clrMapOvr>
+  <p:timing>
+    <p:tnLst>
+      <p:par>
+        <p:cTn xmlns:p14="http://schemas.microsoft.com/office/powerpoint/2010/main" id="1" dur="indefinite" restart="never" nodeType="tmRoot"/>
+      </p:par>
+    </p:tnLst>
+  </p:timing>
 </p:sld>
 </file>
 
@@ -8683,9 +8760,10 @@
               <a:t>/</a:t>
             </a:r>
             <a:r>
-              <a:rPr lang="en-US"/>
+              <a:rPr lang="en-US" dirty="0" err="1"/>
               <a:t>ng-bootcamp</a:t>
             </a:r>
+            <a:endParaRPr lang="en-US" dirty="0"/>
           </a:p>
         </p:txBody>
       </p:sp>
@@ -8699,6 +8777,13 @@
   <p:clrMapOvr>
     <a:masterClrMapping/>
   </p:clrMapOvr>
+  <p:timing>
+    <p:tnLst>
+      <p:par>
+        <p:cTn xmlns:p14="http://schemas.microsoft.com/office/powerpoint/2010/main" id="1" dur="indefinite" restart="never" nodeType="tmRoot"/>
+      </p:par>
+    </p:tnLst>
+  </p:timing>
 </p:sld>
 </file>
 
@@ -8848,6 +8933,13 @@
   <p:clrMapOvr>
     <a:masterClrMapping/>
   </p:clrMapOvr>
+  <p:timing>
+    <p:tnLst>
+      <p:par>
+        <p:cTn xmlns:p14="http://schemas.microsoft.com/office/powerpoint/2010/main" id="1" dur="indefinite" restart="never" nodeType="tmRoot"/>
+      </p:par>
+    </p:tnLst>
+  </p:timing>
 </p:sld>
 </file>
 
@@ -8903,7 +8995,9 @@
         </p:nvSpPr>
         <p:spPr/>
         <p:txBody>
-          <a:bodyPr/>
+          <a:bodyPr>
+            <a:normAutofit fontScale="92500" lnSpcReduction="10000"/>
+          </a:bodyPr>
           <a:lstStyle/>
           <a:p>
             <a:r>
@@ -8925,37 +9019,148 @@
                 <a:latin typeface="Menlo Regular"/>
                 <a:cs typeface="Menlo Regular"/>
               </a:rPr>
-              <a:t> install -g karma</a:t>
-            </a:r>
+              <a:t> install -g </a:t>
+            </a:r>
+            <a:r>
+              <a:rPr lang="en-US" dirty="0" smtClean="0">
+                <a:latin typeface="Menlo Regular"/>
+                <a:cs typeface="Menlo Regular"/>
+              </a:rPr>
+              <a:t>karma-cli karma</a:t>
+            </a:r>
+          </a:p>
+          <a:p>
+            <a:pPr lvl="1"/>
+            <a:r>
+              <a:rPr lang="en-US" dirty="0" err="1" smtClean="0">
+                <a:latin typeface="Menlo Regular"/>
+                <a:cs typeface="Menlo Regular"/>
+              </a:rPr>
+              <a:t>npm</a:t>
+            </a:r>
+            <a:r>
+              <a:rPr lang="en-US" dirty="0" smtClean="0">
+                <a:latin typeface="Menlo Regular"/>
+                <a:cs typeface="Menlo Regular"/>
+              </a:rPr>
+              <a:t> </a:t>
+            </a:r>
+            <a:r>
+              <a:rPr lang="en-US" dirty="0" err="1" smtClean="0">
+                <a:latin typeface="Menlo Regular"/>
+                <a:cs typeface="Menlo Regular"/>
+              </a:rPr>
+              <a:t>init</a:t>
+            </a:r>
+            <a:r>
+              <a:rPr lang="en-US" dirty="0" smtClean="0">
+                <a:latin typeface="Menlo Regular"/>
+                <a:cs typeface="Menlo Regular"/>
+              </a:rPr>
+              <a:t>  # run this if you don’t have a </a:t>
+            </a:r>
+            <a:r>
+              <a:rPr lang="en-US" dirty="0" err="1" smtClean="0">
+                <a:latin typeface="Menlo Regular"/>
+                <a:cs typeface="Menlo Regular"/>
+              </a:rPr>
+              <a:t>package.json</a:t>
+            </a:r>
+            <a:r>
+              <a:rPr lang="en-US" dirty="0" smtClean="0">
+                <a:latin typeface="Menlo Regular"/>
+                <a:cs typeface="Menlo Regular"/>
+              </a:rPr>
+              <a:t> </a:t>
+            </a:r>
+            <a:r>
+              <a:rPr lang="en-US" smtClean="0">
+                <a:latin typeface="Menlo Regular"/>
+                <a:cs typeface="Menlo Regular"/>
+              </a:rPr>
+              <a:t>file already</a:t>
+            </a:r>
+            <a:endParaRPr lang="en-US" dirty="0" smtClean="0">
+              <a:latin typeface="Menlo Regular"/>
+              <a:cs typeface="Menlo Regular"/>
+            </a:endParaRPr>
+          </a:p>
+          <a:p>
+            <a:pPr lvl="1"/>
+            <a:r>
+              <a:rPr lang="en-US" dirty="0" err="1" smtClean="0">
+                <a:latin typeface="Menlo Regular"/>
+                <a:cs typeface="Menlo Regular"/>
+              </a:rPr>
+              <a:t>npm</a:t>
+            </a:r>
+            <a:r>
+              <a:rPr lang="en-US" dirty="0" smtClean="0">
+                <a:latin typeface="Menlo Regular"/>
+                <a:cs typeface="Menlo Regular"/>
+              </a:rPr>
+              <a:t> install --save karma-jasmine karma-chrome-launcher</a:t>
+            </a:r>
+            <a:endParaRPr lang="en-US" dirty="0" smtClean="0">
+              <a:latin typeface="Menlo Regular"/>
+              <a:cs typeface="Menlo Regular"/>
+            </a:endParaRPr>
           </a:p>
           <a:p>
             <a:r>
               <a:rPr lang="en-US" dirty="0" smtClean="0">
                 <a:cs typeface="Menlo Regular"/>
               </a:rPr>
-              <a:t>Configuring Karma</a:t>
+              <a:t>Configuring </a:t>
+            </a:r>
+            <a:r>
+              <a:rPr lang="en-US" dirty="0" smtClean="0">
+                <a:cs typeface="Menlo Regular"/>
+              </a:rPr>
+              <a:t>Karma</a:t>
             </a:r>
           </a:p>
           <a:p>
             <a:pPr lvl="1"/>
             <a:r>
-              <a:rPr lang="en-US" dirty="0" err="1">
+              <a:rPr lang="en-US" dirty="0" smtClean="0">
+                <a:latin typeface="Menlo Regular"/>
                 <a:cs typeface="Menlo Regular"/>
               </a:rPr>
-              <a:t>k</a:t>
+              <a:t>karma </a:t>
+            </a:r>
+            <a:r>
+              <a:rPr lang="en-US" dirty="0" err="1" smtClean="0">
+                <a:latin typeface="Menlo Regular"/>
+                <a:cs typeface="Menlo Regular"/>
+              </a:rPr>
+              <a:t>init</a:t>
+            </a:r>
+            <a:endParaRPr lang="en-US" dirty="0" smtClean="0">
+              <a:latin typeface="Menlo Regular"/>
+              <a:cs typeface="Menlo Regular"/>
+            </a:endParaRPr>
+          </a:p>
+          <a:p>
+            <a:pPr lvl="2"/>
+            <a:r>
+              <a:rPr lang="en-US" dirty="0" smtClean="0">
+                <a:cs typeface="Menlo Regular"/>
+              </a:rPr>
+              <a:t>Creates </a:t>
             </a:r>
             <a:r>
               <a:rPr lang="en-US" dirty="0" err="1" smtClean="0">
                 <a:cs typeface="Menlo Regular"/>
               </a:rPr>
-              <a:t>arma.conf.js</a:t>
+              <a:t>karma.conf.js</a:t>
             </a:r>
             <a:endParaRPr lang="en-US" dirty="0" smtClean="0">
               <a:cs typeface="Menlo Regular"/>
             </a:endParaRPr>
           </a:p>
           <a:p>
-            <a:pPr lvl="1"/>
+            <a:pPr lvl="2"/>
             <a:r>
               <a:rPr lang="en-US" dirty="0" smtClean="0">
                 <a:cs typeface="Menlo Regular"/>
@@ -9017,6 +9222,13 @@
   <p:clrMapOvr>
     <a:masterClrMapping/>
   </p:clrMapOvr>
+  <p:timing>
+    <p:tnLst>
+      <p:par>
+        <p:cTn xmlns:p14="http://schemas.microsoft.com/office/powerpoint/2010/main" id="1" dur="indefinite" restart="never" nodeType="tmRoot"/>
+      </p:par>
+    </p:tnLst>
+  </p:timing>
 </p:sld>
 </file>
 
@@ -9135,6 +9347,13 @@
   <p:clrMapOvr>
     <a:masterClrMapping/>
   </p:clrMapOvr>
+  <p:timing>
+    <p:tnLst>
+      <p:par>
+        <p:cTn xmlns:p14="http://schemas.microsoft.com/office/powerpoint/2010/main" id="1" dur="indefinite" restart="never" nodeType="tmRoot"/>
+      </p:par>
+    </p:tnLst>
+  </p:timing>
 </p:sld>
 </file>
 
@@ -9222,6 +9441,13 @@
   <p:clrMapOvr>
     <a:masterClrMapping/>
   </p:clrMapOvr>
+  <p:timing>
+    <p:tnLst>
+      <p:par>
+        <p:cTn xmlns:p14="http://schemas.microsoft.com/office/powerpoint/2010/main" id="1" dur="indefinite" restart="never" nodeType="tmRoot"/>
+      </p:par>
+    </p:tnLst>
+  </p:timing>
 </p:sld>
 </file>
 
@@ -9708,6 +9934,13 @@
   <p:clrMapOvr>
     <a:masterClrMapping/>
   </p:clrMapOvr>
+  <p:timing>
+    <p:tnLst>
+      <p:par>
+        <p:cTn xmlns:p14="http://schemas.microsoft.com/office/powerpoint/2010/main" id="1" dur="indefinite" restart="never" nodeType="tmRoot"/>
+      </p:par>
+    </p:tnLst>
+  </p:timing>
 </p:sld>
 </file>
 
@@ -10652,6 +10885,13 @@
   <p:clrMapOvr>
     <a:masterClrMapping/>
   </p:clrMapOvr>
+  <p:timing>
+    <p:tnLst>
+      <p:par>
+        <p:cTn xmlns:p14="http://schemas.microsoft.com/office/powerpoint/2010/main" id="1" dur="indefinite" restart="never" nodeType="tmRoot"/>
+      </p:par>
+    </p:tnLst>
+  </p:timing>
 </p:sld>
 </file>
 
@@ -13599,6 +13839,13 @@
   <p:clrMapOvr>
     <a:masterClrMapping/>
   </p:clrMapOvr>
+  <p:timing>
+    <p:tnLst>
+      <p:par>
+        <p:cTn xmlns:p14="http://schemas.microsoft.com/office/powerpoint/2010/main" id="1" dur="indefinite" restart="never" nodeType="tmRoot"/>
+      </p:par>
+    </p:tnLst>
+  </p:timing>
 </p:sld>
 </file>
 
@@ -15433,6 +15680,13 @@
   <p:clrMapOvr>
     <a:masterClrMapping/>
   </p:clrMapOvr>
+  <p:timing>
+    <p:tnLst>
+      <p:par>
+        <p:cTn xmlns:p14="http://schemas.microsoft.com/office/powerpoint/2010/main" id="1" dur="indefinite" restart="never" nodeType="tmRoot"/>
+      </p:par>
+    </p:tnLst>
+  </p:timing>
 </p:sld>
 </file>
 
@@ -15493,6 +15747,13 @@
   <p:clrMapOvr>
     <a:masterClrMapping/>
   </p:clrMapOvr>
+  <p:timing>
+    <p:tnLst>
+      <p:par>
+        <p:cTn xmlns:p14="http://schemas.microsoft.com/office/powerpoint/2010/main" id="1" dur="indefinite" restart="never" nodeType="tmRoot"/>
+      </p:par>
+    </p:tnLst>
+  </p:timing>
 </p:sld>
 </file>
 
@@ -15596,6 +15857,13 @@
   <p:clrMapOvr>
     <a:masterClrMapping/>
   </p:clrMapOvr>
+  <p:timing>
+    <p:tnLst>
+      <p:par>
+        <p:cTn xmlns:p14="http://schemas.microsoft.com/office/powerpoint/2010/main" id="1" dur="indefinite" restart="never" nodeType="tmRoot"/>
+      </p:par>
+    </p:tnLst>
+  </p:timing>
 </p:sld>
 </file>
 
@@ -15732,6 +16000,13 @@
   <p:clrMapOvr>
     <a:masterClrMapping/>
   </p:clrMapOvr>
+  <p:timing>
+    <p:tnLst>
+      <p:par>
+        <p:cTn xmlns:p14="http://schemas.microsoft.com/office/powerpoint/2010/main" id="1" dur="indefinite" restart="never" nodeType="tmRoot"/>
+      </p:par>
+    </p:tnLst>
+  </p:timing>
 </p:sld>
 </file>
 
@@ -16286,6 +16561,13 @@
   <p:clrMapOvr>
     <a:masterClrMapping/>
   </p:clrMapOvr>
+  <p:timing>
+    <p:tnLst>
+      <p:par>
+        <p:cTn xmlns:p14="http://schemas.microsoft.com/office/powerpoint/2010/main" id="1" dur="indefinite" restart="never" nodeType="tmRoot"/>
+      </p:par>
+    </p:tnLst>
+  </p:timing>
 </p:sld>
 </file>
 

</xml_diff>